<commit_message>
Update two MOS test
</commit_message>
<xml_diff>
--- a/EmoDiff-test/img/9_mos_scale.pptx
+++ b/EmoDiff-test/img/9_mos_scale.pptx
@@ -6,6 +6,7 @@
   </p:sldMasterIdLst>
   <p:sldIdLst>
     <p:sldId id="256" r:id="rId2"/>
+    <p:sldId id="257" r:id="rId3"/>
   </p:sldIdLst>
   <p:sldSz cx="12192000" cy="6858000"/>
   <p:notesSz cx="6858000" cy="9144000"/>
@@ -104,6 +105,11 @@
       </a:defRPr>
     </a:lvl9pPr>
   </p:defaultTextStyle>
+  <p:extLst>
+    <p:ext uri="{EFAFB233-063F-42B5-8137-9DF3F51BA10A}">
+      <p15:sldGuideLst xmlns:p15="http://schemas.microsoft.com/office/powerpoint/2012/main"/>
+    </p:ext>
+  </p:extLst>
 </p:presentation>
 </file>
 
@@ -3365,7 +3371,7 @@
         </p:nvSpPr>
         <p:spPr>
           <a:xfrm>
-            <a:off x="2402724" y="4637183"/>
+            <a:off x="2392620" y="4748326"/>
             <a:ext cx="221813" cy="261610"/>
           </a:xfrm>
           <a:prstGeom prst="rect">
@@ -3401,7 +3407,7 @@
         </p:nvSpPr>
         <p:spPr>
           <a:xfrm>
-            <a:off x="2890171" y="4637183"/>
+            <a:off x="2880067" y="4748326"/>
             <a:ext cx="221813" cy="253916"/>
           </a:xfrm>
           <a:prstGeom prst="rect">
@@ -3437,7 +3443,7 @@
         </p:nvSpPr>
         <p:spPr>
           <a:xfrm>
-            <a:off x="3409417" y="4644046"/>
+            <a:off x="3399313" y="4755189"/>
             <a:ext cx="221813" cy="253916"/>
           </a:xfrm>
           <a:prstGeom prst="rect">
@@ -3473,7 +3479,7 @@
         </p:nvSpPr>
         <p:spPr>
           <a:xfrm>
-            <a:off x="3928663" y="4644046"/>
+            <a:off x="3918559" y="4755189"/>
             <a:ext cx="221813" cy="253916"/>
           </a:xfrm>
           <a:prstGeom prst="rect">
@@ -3509,7 +3515,7 @@
         </p:nvSpPr>
         <p:spPr>
           <a:xfrm>
-            <a:off x="4427356" y="4644046"/>
+            <a:off x="4417252" y="4755189"/>
             <a:ext cx="221813" cy="253916"/>
           </a:xfrm>
           <a:prstGeom prst="rect">
@@ -3531,10 +3537,397 @@
           </a:p>
         </p:txBody>
       </p:sp>
+      <p:pic>
+        <p:nvPicPr>
+          <p:cNvPr id="6" name="图片 5">
+            <a:extLst>
+              <a:ext uri="{FF2B5EF4-FFF2-40B4-BE49-F238E27FC236}">
+                <a16:creationId xmlns:a16="http://schemas.microsoft.com/office/drawing/2014/main" id="{CCEE7F2A-5C02-A446-ABC1-39305C5846A4}"/>
+              </a:ext>
+            </a:extLst>
+          </p:cNvPr>
+          <p:cNvPicPr>
+            <a:picLocks noChangeAspect="1"/>
+          </p:cNvPicPr>
+          <p:nvPr/>
+        </p:nvPicPr>
+        <p:blipFill>
+          <a:blip r:embed="rId3"/>
+          <a:stretch>
+            <a:fillRect/>
+          </a:stretch>
+        </p:blipFill>
+        <p:spPr>
+          <a:xfrm>
+            <a:off x="5422804" y="4703834"/>
+            <a:ext cx="1105200" cy="165780"/>
+          </a:xfrm>
+          <a:prstGeom prst="rect">
+            <a:avLst/>
+          </a:prstGeom>
+        </p:spPr>
+      </p:pic>
+      <p:pic>
+        <p:nvPicPr>
+          <p:cNvPr id="13" name="图片 12">
+            <a:extLst>
+              <a:ext uri="{FF2B5EF4-FFF2-40B4-BE49-F238E27FC236}">
+                <a16:creationId xmlns:a16="http://schemas.microsoft.com/office/drawing/2014/main" id="{1DCEEC8A-7B53-E247-8224-8B61AE08E792}"/>
+              </a:ext>
+            </a:extLst>
+          </p:cNvPr>
+          <p:cNvPicPr>
+            <a:picLocks noChangeAspect="1"/>
+          </p:cNvPicPr>
+          <p:nvPr/>
+        </p:nvPicPr>
+        <p:blipFill rotWithShape="1">
+          <a:blip r:embed="rId2"/>
+          <a:srcRect l="4963" t="-412" r="3832"/>
+          <a:stretch/>
+        </p:blipFill>
+        <p:spPr>
+          <a:xfrm>
+            <a:off x="3406367" y="5777000"/>
+            <a:ext cx="2243581" cy="182447"/>
+          </a:xfrm>
+          <a:prstGeom prst="rect">
+            <a:avLst/>
+          </a:prstGeom>
+        </p:spPr>
+      </p:pic>
+      <p:sp>
+        <p:nvSpPr>
+          <p:cNvPr id="14" name="文本框 13">
+            <a:extLst>
+              <a:ext uri="{FF2B5EF4-FFF2-40B4-BE49-F238E27FC236}">
+                <a16:creationId xmlns:a16="http://schemas.microsoft.com/office/drawing/2014/main" id="{A0E833C4-9B08-2E41-B6F9-7F95152CDC66}"/>
+              </a:ext>
+            </a:extLst>
+          </p:cNvPr>
+          <p:cNvSpPr txBox="1"/>
+          <p:nvPr/>
+        </p:nvSpPr>
+        <p:spPr>
+          <a:xfrm>
+            <a:off x="3298696" y="5612475"/>
+            <a:ext cx="221813" cy="261610"/>
+          </a:xfrm>
+          <a:prstGeom prst="rect">
+            <a:avLst/>
+          </a:prstGeom>
+          <a:noFill/>
+        </p:spPr>
+        <p:txBody>
+          <a:bodyPr wrap="square" rtlCol="0">
+            <a:spAutoFit/>
+          </a:bodyPr>
+          <a:lstStyle/>
+          <a:p>
+            <a:r>
+              <a:rPr kumimoji="1" lang="en-US" altLang="zh-CN" sz="1050" b="1" dirty="0"/>
+              <a:t>1</a:t>
+            </a:r>
+            <a:endParaRPr kumimoji="1" lang="zh-CN" altLang="en-US" sz="1050" b="1" dirty="0"/>
+          </a:p>
+        </p:txBody>
+      </p:sp>
+      <p:sp>
+        <p:nvSpPr>
+          <p:cNvPr id="15" name="文本框 14">
+            <a:extLst>
+              <a:ext uri="{FF2B5EF4-FFF2-40B4-BE49-F238E27FC236}">
+                <a16:creationId xmlns:a16="http://schemas.microsoft.com/office/drawing/2014/main" id="{99FB5D71-F6D9-B945-9305-E1E010B643C4}"/>
+              </a:ext>
+            </a:extLst>
+          </p:cNvPr>
+          <p:cNvSpPr txBox="1"/>
+          <p:nvPr/>
+        </p:nvSpPr>
+        <p:spPr>
+          <a:xfrm>
+            <a:off x="3842752" y="5612475"/>
+            <a:ext cx="221813" cy="253916"/>
+          </a:xfrm>
+          <a:prstGeom prst="rect">
+            <a:avLst/>
+          </a:prstGeom>
+          <a:noFill/>
+        </p:spPr>
+        <p:txBody>
+          <a:bodyPr wrap="square" rtlCol="0">
+            <a:spAutoFit/>
+          </a:bodyPr>
+          <a:lstStyle/>
+          <a:p>
+            <a:r>
+              <a:rPr kumimoji="1" lang="en-US" altLang="zh-CN" sz="1050" b="1" dirty="0"/>
+              <a:t>2</a:t>
+            </a:r>
+            <a:endParaRPr kumimoji="1" lang="zh-CN" altLang="en-US" sz="1050" b="1" dirty="0"/>
+          </a:p>
+        </p:txBody>
+      </p:sp>
+      <p:sp>
+        <p:nvSpPr>
+          <p:cNvPr id="16" name="文本框 15">
+            <a:extLst>
+              <a:ext uri="{FF2B5EF4-FFF2-40B4-BE49-F238E27FC236}">
+                <a16:creationId xmlns:a16="http://schemas.microsoft.com/office/drawing/2014/main" id="{D32B1DE4-6C8F-6A4B-A5FA-568D5792478E}"/>
+              </a:ext>
+            </a:extLst>
+          </p:cNvPr>
+          <p:cNvSpPr txBox="1"/>
+          <p:nvPr/>
+        </p:nvSpPr>
+        <p:spPr>
+          <a:xfrm>
+            <a:off x="4411535" y="5612475"/>
+            <a:ext cx="221813" cy="253916"/>
+          </a:xfrm>
+          <a:prstGeom prst="rect">
+            <a:avLst/>
+          </a:prstGeom>
+          <a:noFill/>
+        </p:spPr>
+        <p:txBody>
+          <a:bodyPr wrap="square" rtlCol="0">
+            <a:spAutoFit/>
+          </a:bodyPr>
+          <a:lstStyle/>
+          <a:p>
+            <a:r>
+              <a:rPr kumimoji="1" lang="en-US" altLang="zh-CN" sz="1050" b="1" dirty="0"/>
+              <a:t>3</a:t>
+            </a:r>
+            <a:endParaRPr kumimoji="1" lang="zh-CN" altLang="en-US" sz="1050" b="1" dirty="0"/>
+          </a:p>
+        </p:txBody>
+      </p:sp>
+      <p:sp>
+        <p:nvSpPr>
+          <p:cNvPr id="17" name="文本框 16">
+            <a:extLst>
+              <a:ext uri="{FF2B5EF4-FFF2-40B4-BE49-F238E27FC236}">
+                <a16:creationId xmlns:a16="http://schemas.microsoft.com/office/drawing/2014/main" id="{ACD3BB8C-093D-8645-B7F2-FE8538A6A483}"/>
+              </a:ext>
+            </a:extLst>
+          </p:cNvPr>
+          <p:cNvSpPr txBox="1"/>
+          <p:nvPr/>
+        </p:nvSpPr>
+        <p:spPr>
+          <a:xfrm>
+            <a:off x="4960758" y="5620169"/>
+            <a:ext cx="221813" cy="253916"/>
+          </a:xfrm>
+          <a:prstGeom prst="rect">
+            <a:avLst/>
+          </a:prstGeom>
+          <a:noFill/>
+        </p:spPr>
+        <p:txBody>
+          <a:bodyPr wrap="square" rtlCol="0">
+            <a:spAutoFit/>
+          </a:bodyPr>
+          <a:lstStyle/>
+          <a:p>
+            <a:r>
+              <a:rPr kumimoji="1" lang="en-US" altLang="zh-CN" sz="1050" b="1" dirty="0"/>
+              <a:t>4</a:t>
+            </a:r>
+            <a:endParaRPr kumimoji="1" lang="zh-CN" altLang="en-US" sz="1050" b="1" dirty="0"/>
+          </a:p>
+        </p:txBody>
+      </p:sp>
+      <p:sp>
+        <p:nvSpPr>
+          <p:cNvPr id="18" name="文本框 17">
+            <a:extLst>
+              <a:ext uri="{FF2B5EF4-FFF2-40B4-BE49-F238E27FC236}">
+                <a16:creationId xmlns:a16="http://schemas.microsoft.com/office/drawing/2014/main" id="{1043C684-D5F6-D541-813E-4EDC77E4E9C9}"/>
+              </a:ext>
+            </a:extLst>
+          </p:cNvPr>
+          <p:cNvSpPr txBox="1"/>
+          <p:nvPr/>
+        </p:nvSpPr>
+        <p:spPr>
+          <a:xfrm>
+            <a:off x="5504814" y="5620169"/>
+            <a:ext cx="221813" cy="253916"/>
+          </a:xfrm>
+          <a:prstGeom prst="rect">
+            <a:avLst/>
+          </a:prstGeom>
+          <a:noFill/>
+        </p:spPr>
+        <p:txBody>
+          <a:bodyPr wrap="square" rtlCol="0">
+            <a:spAutoFit/>
+          </a:bodyPr>
+          <a:lstStyle/>
+          <a:p>
+            <a:r>
+              <a:rPr kumimoji="1" lang="en-US" altLang="zh-CN" sz="1050" b="1" dirty="0"/>
+              <a:t>5</a:t>
+            </a:r>
+            <a:endParaRPr kumimoji="1" lang="zh-CN" altLang="en-US" sz="1050" b="1" dirty="0"/>
+          </a:p>
+        </p:txBody>
+      </p:sp>
+      <p:pic>
+        <p:nvPicPr>
+          <p:cNvPr id="20" name="图片 19">
+            <a:extLst>
+              <a:ext uri="{FF2B5EF4-FFF2-40B4-BE49-F238E27FC236}">
+                <a16:creationId xmlns:a16="http://schemas.microsoft.com/office/drawing/2014/main" id="{EE6EF98D-B3D7-7546-BE3C-B89ED6E48DB9}"/>
+              </a:ext>
+            </a:extLst>
+          </p:cNvPr>
+          <p:cNvPicPr>
+            <a:picLocks noChangeAspect="1"/>
+          </p:cNvPicPr>
+          <p:nvPr/>
+        </p:nvPicPr>
+        <p:blipFill>
+          <a:blip r:embed="rId4"/>
+          <a:stretch>
+            <a:fillRect/>
+          </a:stretch>
+        </p:blipFill>
+        <p:spPr>
+          <a:xfrm>
+            <a:off x="5071664" y="6311045"/>
+            <a:ext cx="1105200" cy="135835"/>
+          </a:xfrm>
+          <a:prstGeom prst="rect">
+            <a:avLst/>
+          </a:prstGeom>
+        </p:spPr>
+      </p:pic>
     </p:spTree>
     <p:extLst>
       <p:ext uri="{BB962C8B-B14F-4D97-AF65-F5344CB8AC3E}">
         <p14:creationId xmlns:p14="http://schemas.microsoft.com/office/powerpoint/2010/main" val="3977998719"/>
+      </p:ext>
+    </p:extLst>
+  </p:cSld>
+  <p:clrMapOvr>
+    <a:masterClrMapping/>
+  </p:clrMapOvr>
+</p:sld>
+</file>
+
+<file path=ppt/slides/slide2.xml><?xml version="1.0" encoding="utf-8"?>
+<p:sld xmlns:a="http://schemas.openxmlformats.org/drawingml/2006/main" xmlns:r="http://schemas.openxmlformats.org/officeDocument/2006/relationships" xmlns:p="http://schemas.openxmlformats.org/presentationml/2006/main">
+  <p:cSld>
+    <p:spTree>
+      <p:nvGrpSpPr>
+        <p:cNvPr id="1" name=""/>
+        <p:cNvGrpSpPr/>
+        <p:nvPr/>
+      </p:nvGrpSpPr>
+      <p:grpSpPr>
+        <a:xfrm>
+          <a:off x="0" y="0"/>
+          <a:ext cx="0" cy="0"/>
+          <a:chOff x="0" y="0"/>
+          <a:chExt cx="0" cy="0"/>
+        </a:xfrm>
+      </p:grpSpPr>
+      <p:pic>
+        <p:nvPicPr>
+          <p:cNvPr id="5" name="图片 4">
+            <a:extLst>
+              <a:ext uri="{FF2B5EF4-FFF2-40B4-BE49-F238E27FC236}">
+                <a16:creationId xmlns:a16="http://schemas.microsoft.com/office/drawing/2014/main" id="{9A63531F-CF47-D247-9DB6-50B08EFDFE92}"/>
+              </a:ext>
+            </a:extLst>
+          </p:cNvPr>
+          <p:cNvPicPr>
+            <a:picLocks noChangeAspect="1"/>
+          </p:cNvPicPr>
+          <p:nvPr/>
+        </p:nvPicPr>
+        <p:blipFill rotWithShape="1">
+          <a:blip r:embed="rId2"/>
+          <a:srcRect l="4261" t="14039" r="4261" b="-1"/>
+          <a:stretch/>
+        </p:blipFill>
+        <p:spPr>
+          <a:xfrm>
+            <a:off x="5584825" y="3178175"/>
+            <a:ext cx="1022350" cy="141924"/>
+          </a:xfrm>
+          <a:prstGeom prst="rect">
+            <a:avLst/>
+          </a:prstGeom>
+        </p:spPr>
+      </p:pic>
+      <p:pic>
+        <p:nvPicPr>
+          <p:cNvPr id="7" name="图片 6">
+            <a:extLst>
+              <a:ext uri="{FF2B5EF4-FFF2-40B4-BE49-F238E27FC236}">
+                <a16:creationId xmlns:a16="http://schemas.microsoft.com/office/drawing/2014/main" id="{D388763A-3911-AA46-9F2B-4FA8633A320F}"/>
+              </a:ext>
+            </a:extLst>
+          </p:cNvPr>
+          <p:cNvPicPr>
+            <a:picLocks noChangeAspect="1"/>
+          </p:cNvPicPr>
+          <p:nvPr/>
+        </p:nvPicPr>
+        <p:blipFill rotWithShape="1">
+          <a:blip r:embed="rId3"/>
+          <a:srcRect l="4261" t="16667" r="4261"/>
+          <a:stretch/>
+        </p:blipFill>
+        <p:spPr>
+          <a:xfrm>
+            <a:off x="5584825" y="3403600"/>
+            <a:ext cx="1022350" cy="63500"/>
+          </a:xfrm>
+          <a:prstGeom prst="rect">
+            <a:avLst/>
+          </a:prstGeom>
+        </p:spPr>
+      </p:pic>
+      <p:pic>
+        <p:nvPicPr>
+          <p:cNvPr id="9" name="图片 8">
+            <a:extLst>
+              <a:ext uri="{FF2B5EF4-FFF2-40B4-BE49-F238E27FC236}">
+                <a16:creationId xmlns:a16="http://schemas.microsoft.com/office/drawing/2014/main" id="{4CD486AF-0E22-2140-A910-7BB1B73697E3}"/>
+              </a:ext>
+            </a:extLst>
+          </p:cNvPr>
+          <p:cNvPicPr>
+            <a:picLocks noChangeAspect="1"/>
+          </p:cNvPicPr>
+          <p:nvPr/>
+        </p:nvPicPr>
+        <p:blipFill>
+          <a:blip r:embed="rId4"/>
+          <a:stretch>
+            <a:fillRect/>
+          </a:stretch>
+        </p:blipFill>
+        <p:spPr>
+          <a:xfrm>
+            <a:off x="4826000" y="2676525"/>
+            <a:ext cx="2540000" cy="203200"/>
+          </a:xfrm>
+          <a:prstGeom prst="rect">
+            <a:avLst/>
+          </a:prstGeom>
+        </p:spPr>
+      </p:pic>
+    </p:spTree>
+    <p:extLst>
+      <p:ext uri="{BB962C8B-B14F-4D97-AF65-F5344CB8AC3E}">
+        <p14:creationId xmlns:p14="http://schemas.microsoft.com/office/powerpoint/2010/main" val="7334396"/>
       </p:ext>
     </p:extLst>
   </p:cSld>

</xml_diff>